<commit_message>
add preliminary dartmouth CFA data (stick 1)
</commit_message>
<xml_diff>
--- a/data/sampling/master_coords_map.pptx
+++ b/data/sampling/master_coords_map.pptx
@@ -201,7 +201,7 @@
           <a:p>
             <a:fld id="{01D570FF-91C6-734D-9CB0-CB0B0914B983}" type="datetimeFigureOut">
               <a:rPr lang="en-US" smtClean="0"/>
-              <a:t>9/30/24</a:t>
+              <a:t>10/9/24</a:t>
             </a:fld>
             <a:endParaRPr lang="en-US"/>
           </a:p>
@@ -1115,7 +1115,7 @@
           <a:p>
             <a:fld id="{44B5AA74-E516-FF41-BA14-5BA898D18DE1}" type="datetimeFigureOut">
               <a:rPr lang="en-US" smtClean="0"/>
-              <a:t>9/30/24</a:t>
+              <a:t>10/9/24</a:t>
             </a:fld>
             <a:endParaRPr lang="en-US"/>
           </a:p>
@@ -1285,7 +1285,7 @@
           <a:p>
             <a:fld id="{44B5AA74-E516-FF41-BA14-5BA898D18DE1}" type="datetimeFigureOut">
               <a:rPr lang="en-US" smtClean="0"/>
-              <a:t>9/30/24</a:t>
+              <a:t>10/9/24</a:t>
             </a:fld>
             <a:endParaRPr lang="en-US"/>
           </a:p>
@@ -1465,7 +1465,7 @@
           <a:p>
             <a:fld id="{44B5AA74-E516-FF41-BA14-5BA898D18DE1}" type="datetimeFigureOut">
               <a:rPr lang="en-US" smtClean="0"/>
-              <a:t>9/30/24</a:t>
+              <a:t>10/9/24</a:t>
             </a:fld>
             <a:endParaRPr lang="en-US"/>
           </a:p>
@@ -1635,7 +1635,7 @@
           <a:p>
             <a:fld id="{44B5AA74-E516-FF41-BA14-5BA898D18DE1}" type="datetimeFigureOut">
               <a:rPr lang="en-US" smtClean="0"/>
-              <a:t>9/30/24</a:t>
+              <a:t>10/9/24</a:t>
             </a:fld>
             <a:endParaRPr lang="en-US"/>
           </a:p>
@@ -1881,7 +1881,7 @@
           <a:p>
             <a:fld id="{44B5AA74-E516-FF41-BA14-5BA898D18DE1}" type="datetimeFigureOut">
               <a:rPr lang="en-US" smtClean="0"/>
-              <a:t>9/30/24</a:t>
+              <a:t>10/9/24</a:t>
             </a:fld>
             <a:endParaRPr lang="en-US"/>
           </a:p>
@@ -2113,7 +2113,7 @@
           <a:p>
             <a:fld id="{44B5AA74-E516-FF41-BA14-5BA898D18DE1}" type="datetimeFigureOut">
               <a:rPr lang="en-US" smtClean="0"/>
-              <a:t>9/30/24</a:t>
+              <a:t>10/9/24</a:t>
             </a:fld>
             <a:endParaRPr lang="en-US"/>
           </a:p>
@@ -2480,7 +2480,7 @@
           <a:p>
             <a:fld id="{44B5AA74-E516-FF41-BA14-5BA898D18DE1}" type="datetimeFigureOut">
               <a:rPr lang="en-US" smtClean="0"/>
-              <a:t>9/30/24</a:t>
+              <a:t>10/9/24</a:t>
             </a:fld>
             <a:endParaRPr lang="en-US"/>
           </a:p>
@@ -2598,7 +2598,7 @@
           <a:p>
             <a:fld id="{44B5AA74-E516-FF41-BA14-5BA898D18DE1}" type="datetimeFigureOut">
               <a:rPr lang="en-US" smtClean="0"/>
-              <a:t>9/30/24</a:t>
+              <a:t>10/9/24</a:t>
             </a:fld>
             <a:endParaRPr lang="en-US"/>
           </a:p>
@@ -2693,7 +2693,7 @@
           <a:p>
             <a:fld id="{44B5AA74-E516-FF41-BA14-5BA898D18DE1}" type="datetimeFigureOut">
               <a:rPr lang="en-US" smtClean="0"/>
-              <a:t>9/30/24</a:t>
+              <a:t>10/9/24</a:t>
             </a:fld>
             <a:endParaRPr lang="en-US"/>
           </a:p>
@@ -2970,7 +2970,7 @@
           <a:p>
             <a:fld id="{44B5AA74-E516-FF41-BA14-5BA898D18DE1}" type="datetimeFigureOut">
               <a:rPr lang="en-US" smtClean="0"/>
-              <a:t>9/30/24</a:t>
+              <a:t>10/9/24</a:t>
             </a:fld>
             <a:endParaRPr lang="en-US"/>
           </a:p>
@@ -3227,7 +3227,7 @@
           <a:p>
             <a:fld id="{44B5AA74-E516-FF41-BA14-5BA898D18DE1}" type="datetimeFigureOut">
               <a:rPr lang="en-US" smtClean="0"/>
-              <a:t>9/30/24</a:t>
+              <a:t>10/9/24</a:t>
             </a:fld>
             <a:endParaRPr lang="en-US"/>
           </a:p>
@@ -3440,7 +3440,7 @@
           <a:p>
             <a:fld id="{44B5AA74-E516-FF41-BA14-5BA898D18DE1}" type="datetimeFigureOut">
               <a:rPr lang="en-US" smtClean="0"/>
-              <a:t>9/30/24</a:t>
+              <a:t>10/9/24</a:t>
             </a:fld>
             <a:endParaRPr lang="en-US"/>
           </a:p>
@@ -7748,7 +7748,7 @@
             <a:pPr algn="ctr"/>
             <a:r>
               <a:rPr lang="en-US" sz="1400" b="1" dirty="0"/>
-              <a:t>ISO_R</a:t>
+              <a:t>ISO_T</a:t>
             </a:r>
           </a:p>
         </p:txBody>
@@ -15004,9 +15004,9 @@
           <a:prstGeom prst="line">
             <a:avLst/>
           </a:prstGeom>
-          <a:ln w="38100">
+          <a:ln w="76200">
             <a:solidFill>
-              <a:schemeClr val="tx1"/>
+              <a:schemeClr val="accent5"/>
             </a:solidFill>
           </a:ln>
         </p:spPr>
@@ -18517,6 +18517,50 @@
           </a:p>
         </p:txBody>
       </p:sp>
+      <p:cxnSp>
+        <p:nvCxnSpPr>
+          <p:cNvPr id="3" name="Straight Connector 2">
+            <a:extLst>
+              <a:ext uri="{FF2B5EF4-FFF2-40B4-BE49-F238E27FC236}">
+                <a16:creationId xmlns:a16="http://schemas.microsoft.com/office/drawing/2014/main" id="{2281D5E9-B34C-C62B-95DF-675B309E45C4}"/>
+              </a:ext>
+            </a:extLst>
+          </p:cNvPr>
+          <p:cNvCxnSpPr>
+            <a:cxnSpLocks/>
+            <a:stCxn id="5" idx="6"/>
+          </p:cNvCxnSpPr>
+          <p:nvPr/>
+        </p:nvCxnSpPr>
+        <p:spPr>
+          <a:xfrm flipH="1">
+            <a:off x="4359785" y="7463872"/>
+            <a:ext cx="4364873" cy="10680"/>
+          </a:xfrm>
+          <a:prstGeom prst="line">
+            <a:avLst/>
+          </a:prstGeom>
+          <a:ln w="76200">
+            <a:solidFill>
+              <a:schemeClr val="accent5"/>
+            </a:solidFill>
+          </a:ln>
+        </p:spPr>
+        <p:style>
+          <a:lnRef idx="2">
+            <a:schemeClr val="accent1"/>
+          </a:lnRef>
+          <a:fillRef idx="0">
+            <a:schemeClr val="accent1"/>
+          </a:fillRef>
+          <a:effectRef idx="1">
+            <a:schemeClr val="accent1"/>
+          </a:effectRef>
+          <a:fontRef idx="minor">
+            <a:schemeClr val="tx1"/>
+          </a:fontRef>
+        </p:style>
+      </p:cxnSp>
     </p:spTree>
     <p:extLst>
       <p:ext uri="{BB962C8B-B14F-4D97-AF65-F5344CB8AC3E}">
@@ -18706,7 +18750,7 @@
         <p:spPr>
           <a:xfrm>
             <a:off x="388898" y="330740"/>
-            <a:ext cx="7626693" cy="2339102"/>
+            <a:ext cx="7626693" cy="584775"/>
           </a:xfrm>
           <a:prstGeom prst="rect">
             <a:avLst/>
@@ -18723,18 +18767,6 @@
               <a:rPr lang="en-US" sz="3200" b="1" dirty="0"/>
               <a:t>ALHIC2302 – 158</a:t>
             </a:r>
-          </a:p>
-          <a:p>
-            <a:endParaRPr lang="en-US" sz="3200" b="1" dirty="0"/>
-          </a:p>
-          <a:p>
-            <a:r>
-              <a:rPr lang="en-US" sz="3200" b="1" dirty="0"/>
-              <a:t>ISO_L AND R might be wrong way around – will confirm</a:t>
-            </a:r>
-          </a:p>
-          <a:p>
-            <a:endParaRPr lang="en-US" dirty="0"/>
           </a:p>
         </p:txBody>
       </p:sp>
@@ -19970,7 +20002,7 @@
           <p:nvPr>
             <p:extLst>
               <p:ext uri="{D42A27DB-BD31-4B8C-83A1-F6EECF244321}">
-                <p14:modId xmlns:p14="http://schemas.microsoft.com/office/powerpoint/2010/main" val="352647365"/>
+                <p14:modId xmlns:p14="http://schemas.microsoft.com/office/powerpoint/2010/main" val="1525886895"/>
               </p:ext>
             </p:extLst>
           </p:nvPr>
@@ -20363,7 +20395,7 @@
                       </a:pPr>
                       <a:r>
                         <a:rPr lang="en-US" sz="1200" dirty="0"/>
-                        <a:t>86+0+19=15</a:t>
+                        <a:t>86+0+19=105</a:t>
                       </a:r>
                     </a:p>
                   </a:txBody>

</xml_diff>

<commit_message>
integrate new stick 2 data from dartmouth
</commit_message>
<xml_diff>
--- a/data/sampling/master_coords_map.pptx
+++ b/data/sampling/master_coords_map.pptx
@@ -201,7 +201,7 @@
           <a:p>
             <a:fld id="{01D570FF-91C6-734D-9CB0-CB0B0914B983}" type="datetimeFigureOut">
               <a:rPr lang="en-US" smtClean="0"/>
-              <a:t>10/9/24</a:t>
+              <a:t>10/17/24</a:t>
             </a:fld>
             <a:endParaRPr lang="en-US"/>
           </a:p>
@@ -1115,7 +1115,7 @@
           <a:p>
             <a:fld id="{44B5AA74-E516-FF41-BA14-5BA898D18DE1}" type="datetimeFigureOut">
               <a:rPr lang="en-US" smtClean="0"/>
-              <a:t>10/9/24</a:t>
+              <a:t>10/17/24</a:t>
             </a:fld>
             <a:endParaRPr lang="en-US"/>
           </a:p>
@@ -1285,7 +1285,7 @@
           <a:p>
             <a:fld id="{44B5AA74-E516-FF41-BA14-5BA898D18DE1}" type="datetimeFigureOut">
               <a:rPr lang="en-US" smtClean="0"/>
-              <a:t>10/9/24</a:t>
+              <a:t>10/17/24</a:t>
             </a:fld>
             <a:endParaRPr lang="en-US"/>
           </a:p>
@@ -1465,7 +1465,7 @@
           <a:p>
             <a:fld id="{44B5AA74-E516-FF41-BA14-5BA898D18DE1}" type="datetimeFigureOut">
               <a:rPr lang="en-US" smtClean="0"/>
-              <a:t>10/9/24</a:t>
+              <a:t>10/17/24</a:t>
             </a:fld>
             <a:endParaRPr lang="en-US"/>
           </a:p>
@@ -1635,7 +1635,7 @@
           <a:p>
             <a:fld id="{44B5AA74-E516-FF41-BA14-5BA898D18DE1}" type="datetimeFigureOut">
               <a:rPr lang="en-US" smtClean="0"/>
-              <a:t>10/9/24</a:t>
+              <a:t>10/17/24</a:t>
             </a:fld>
             <a:endParaRPr lang="en-US"/>
           </a:p>
@@ -1881,7 +1881,7 @@
           <a:p>
             <a:fld id="{44B5AA74-E516-FF41-BA14-5BA898D18DE1}" type="datetimeFigureOut">
               <a:rPr lang="en-US" smtClean="0"/>
-              <a:t>10/9/24</a:t>
+              <a:t>10/17/24</a:t>
             </a:fld>
             <a:endParaRPr lang="en-US"/>
           </a:p>
@@ -2113,7 +2113,7 @@
           <a:p>
             <a:fld id="{44B5AA74-E516-FF41-BA14-5BA898D18DE1}" type="datetimeFigureOut">
               <a:rPr lang="en-US" smtClean="0"/>
-              <a:t>10/9/24</a:t>
+              <a:t>10/17/24</a:t>
             </a:fld>
             <a:endParaRPr lang="en-US"/>
           </a:p>
@@ -2480,7 +2480,7 @@
           <a:p>
             <a:fld id="{44B5AA74-E516-FF41-BA14-5BA898D18DE1}" type="datetimeFigureOut">
               <a:rPr lang="en-US" smtClean="0"/>
-              <a:t>10/9/24</a:t>
+              <a:t>10/17/24</a:t>
             </a:fld>
             <a:endParaRPr lang="en-US"/>
           </a:p>
@@ -2598,7 +2598,7 @@
           <a:p>
             <a:fld id="{44B5AA74-E516-FF41-BA14-5BA898D18DE1}" type="datetimeFigureOut">
               <a:rPr lang="en-US" smtClean="0"/>
-              <a:t>10/9/24</a:t>
+              <a:t>10/17/24</a:t>
             </a:fld>
             <a:endParaRPr lang="en-US"/>
           </a:p>
@@ -2693,7 +2693,7 @@
           <a:p>
             <a:fld id="{44B5AA74-E516-FF41-BA14-5BA898D18DE1}" type="datetimeFigureOut">
               <a:rPr lang="en-US" smtClean="0"/>
-              <a:t>10/9/24</a:t>
+              <a:t>10/17/24</a:t>
             </a:fld>
             <a:endParaRPr lang="en-US"/>
           </a:p>
@@ -2970,7 +2970,7 @@
           <a:p>
             <a:fld id="{44B5AA74-E516-FF41-BA14-5BA898D18DE1}" type="datetimeFigureOut">
               <a:rPr lang="en-US" smtClean="0"/>
-              <a:t>10/9/24</a:t>
+              <a:t>10/17/24</a:t>
             </a:fld>
             <a:endParaRPr lang="en-US"/>
           </a:p>
@@ -3227,7 +3227,7 @@
           <a:p>
             <a:fld id="{44B5AA74-E516-FF41-BA14-5BA898D18DE1}" type="datetimeFigureOut">
               <a:rPr lang="en-US" smtClean="0"/>
-              <a:t>10/9/24</a:t>
+              <a:t>10/17/24</a:t>
             </a:fld>
             <a:endParaRPr lang="en-US"/>
           </a:p>
@@ -3440,7 +3440,7 @@
           <a:p>
             <a:fld id="{44B5AA74-E516-FF41-BA14-5BA898D18DE1}" type="datetimeFigureOut">
               <a:rPr lang="en-US" smtClean="0"/>
-              <a:t>10/9/24</a:t>
+              <a:t>10/17/24</a:t>
             </a:fld>
             <a:endParaRPr lang="en-US"/>
           </a:p>
@@ -16930,14 +16930,14 @@
           <p:nvPr>
             <p:extLst>
               <p:ext uri="{D42A27DB-BD31-4B8C-83A1-F6EECF244321}">
-                <p14:modId xmlns:p14="http://schemas.microsoft.com/office/powerpoint/2010/main" val="3394835788"/>
+                <p14:modId xmlns:p14="http://schemas.microsoft.com/office/powerpoint/2010/main" val="1015397949"/>
               </p:ext>
             </p:extLst>
           </p:nvPr>
         </p:nvGraphicFramePr>
         <p:xfrm>
           <a:off x="9115054" y="7034113"/>
-          <a:ext cx="3382455" cy="5482152"/>
+          <a:ext cx="3382455" cy="5605104"/>
         </p:xfrm>
         <a:graphic>
           <a:graphicData uri="http://schemas.openxmlformats.org/drawingml/2006/table">
@@ -17054,7 +17054,7 @@
                       <a:pPr algn="ctr"/>
                       <a:r>
                         <a:rPr lang="en-US" sz="1200" dirty="0"/>
-                        <a:t>35</a:t>
+                        <a:t>0 (Q2 is 35mm deeper)</a:t>
                       </a:r>
                     </a:p>
                   </a:txBody>
@@ -17100,7 +17100,7 @@
                       <a:pPr algn="ctr"/>
                       <a:r>
                         <a:rPr lang="en-US" sz="1200" dirty="0"/>
-                        <a:t>35+2=37</a:t>
+                        <a:t>0+2=2</a:t>
                       </a:r>
                     </a:p>
                   </a:txBody>
@@ -17146,7 +17146,7 @@
                       <a:pPr algn="ctr"/>
                       <a:r>
                         <a:rPr lang="en-US" sz="1200" dirty="0"/>
-                        <a:t>35+0=35</a:t>
+                        <a:t>0=-0</a:t>
                       </a:r>
                     </a:p>
                   </a:txBody>
@@ -17199,7 +17199,7 @@
                       <a:pPr algn="ctr"/>
                       <a:r>
                         <a:rPr lang="en-US" sz="1200" dirty="0"/>
-                        <a:t>35+6=41</a:t>
+                        <a:t>6</a:t>
                       </a:r>
                     </a:p>
                   </a:txBody>
@@ -17261,7 +17261,7 @@
                       </a:pPr>
                       <a:r>
                         <a:rPr lang="en-US" sz="1200" dirty="0"/>
-                        <a:t>35+6+13=54</a:t>
+                        <a:t>19</a:t>
                       </a:r>
                     </a:p>
                   </a:txBody>
@@ -17323,7 +17323,7 @@
                       </a:pPr>
                       <a:r>
                         <a:rPr lang="en-US" sz="1200" dirty="0"/>
-                        <a:t>35+6+2=43</a:t>
+                        <a:t>8</a:t>
                       </a:r>
                     </a:p>
                   </a:txBody>
@@ -17385,7 +17385,7 @@
                       </a:pPr>
                       <a:r>
                         <a:rPr lang="en-US" sz="1200" dirty="0"/>
-                        <a:t>35+6+0=41</a:t>
+                        <a:t>6</a:t>
                       </a:r>
                     </a:p>
                   </a:txBody>
@@ -17408,7 +17408,7 @@
                   </a:ext>
                 </a:extLst>
               </a:tr>
-              <a:tr h="538008">
+              <a:tr h="660960">
                 <a:tc>
                   <a:txBody>
                     <a:bodyPr/>
@@ -17447,7 +17447,7 @@
                       </a:pPr>
                       <a:r>
                         <a:rPr lang="en-US" sz="1200" dirty="0"/>
-                        <a:t>35+0=35</a:t>
+                        <a:t>0</a:t>
                       </a:r>
                     </a:p>
                   </a:txBody>
@@ -17492,14 +17492,17 @@
                     <a:p>
                       <a:pPr algn="ctr"/>
                       <a:r>
-                        <a:rPr lang="en-US" sz="1200" dirty="0"/>
-                        <a:t>0</a:t>
+                        <a:rPr lang="en-US" sz="1200"/>
+                        <a:t>35+5=40</a:t>
                       </a:r>
+                      <a:endParaRPr lang="en-US" sz="1200" dirty="0"/>
                     </a:p>
                   </a:txBody>
                   <a:tcPr anchor="ctr">
                     <a:solidFill>
-                      <a:srgbClr val="FFFF00"/>
+                      <a:schemeClr val="bg2">
+                        <a:lumMod val="90000"/>
+                      </a:schemeClr>
                     </a:solidFill>
                   </a:tcPr>
                 </a:tc>
@@ -17512,7 +17515,13 @@
                       <a:endParaRPr lang="en-US" sz="1200" dirty="0"/>
                     </a:p>
                   </a:txBody>
-                  <a:tcPr anchor="ctr"/>
+                  <a:tcPr anchor="ctr">
+                    <a:solidFill>
+                      <a:schemeClr val="bg2">
+                        <a:lumMod val="90000"/>
+                      </a:schemeClr>
+                    </a:solidFill>
+                  </a:tcPr>
                 </a:tc>
                 <a:extLst>
                   <a:ext uri="{0D108BD9-81ED-4DB2-BD59-A6C34878D82A}">

</xml_diff>

<commit_message>
catchup on misc minor changes
</commit_message>
<xml_diff>
--- a/data/sampling/master_coords_map.pptx
+++ b/data/sampling/master_coords_map.pptx
@@ -201,7 +201,7 @@
           <a:p>
             <a:fld id="{01D570FF-91C6-734D-9CB0-CB0B0914B983}" type="datetimeFigureOut">
               <a:rPr lang="en-US" smtClean="0"/>
-              <a:t>10/17/24</a:t>
+              <a:t>11/14/24</a:t>
             </a:fld>
             <a:endParaRPr lang="en-US"/>
           </a:p>
@@ -1115,7 +1115,7 @@
           <a:p>
             <a:fld id="{44B5AA74-E516-FF41-BA14-5BA898D18DE1}" type="datetimeFigureOut">
               <a:rPr lang="en-US" smtClean="0"/>
-              <a:t>10/17/24</a:t>
+              <a:t>11/14/24</a:t>
             </a:fld>
             <a:endParaRPr lang="en-US"/>
           </a:p>
@@ -1285,7 +1285,7 @@
           <a:p>
             <a:fld id="{44B5AA74-E516-FF41-BA14-5BA898D18DE1}" type="datetimeFigureOut">
               <a:rPr lang="en-US" smtClean="0"/>
-              <a:t>10/17/24</a:t>
+              <a:t>11/14/24</a:t>
             </a:fld>
             <a:endParaRPr lang="en-US"/>
           </a:p>
@@ -1465,7 +1465,7 @@
           <a:p>
             <a:fld id="{44B5AA74-E516-FF41-BA14-5BA898D18DE1}" type="datetimeFigureOut">
               <a:rPr lang="en-US" smtClean="0"/>
-              <a:t>10/17/24</a:t>
+              <a:t>11/14/24</a:t>
             </a:fld>
             <a:endParaRPr lang="en-US"/>
           </a:p>
@@ -1635,7 +1635,7 @@
           <a:p>
             <a:fld id="{44B5AA74-E516-FF41-BA14-5BA898D18DE1}" type="datetimeFigureOut">
               <a:rPr lang="en-US" smtClean="0"/>
-              <a:t>10/17/24</a:t>
+              <a:t>11/14/24</a:t>
             </a:fld>
             <a:endParaRPr lang="en-US"/>
           </a:p>
@@ -1881,7 +1881,7 @@
           <a:p>
             <a:fld id="{44B5AA74-E516-FF41-BA14-5BA898D18DE1}" type="datetimeFigureOut">
               <a:rPr lang="en-US" smtClean="0"/>
-              <a:t>10/17/24</a:t>
+              <a:t>11/14/24</a:t>
             </a:fld>
             <a:endParaRPr lang="en-US"/>
           </a:p>
@@ -2113,7 +2113,7 @@
           <a:p>
             <a:fld id="{44B5AA74-E516-FF41-BA14-5BA898D18DE1}" type="datetimeFigureOut">
               <a:rPr lang="en-US" smtClean="0"/>
-              <a:t>10/17/24</a:t>
+              <a:t>11/14/24</a:t>
             </a:fld>
             <a:endParaRPr lang="en-US"/>
           </a:p>
@@ -2480,7 +2480,7 @@
           <a:p>
             <a:fld id="{44B5AA74-E516-FF41-BA14-5BA898D18DE1}" type="datetimeFigureOut">
               <a:rPr lang="en-US" smtClean="0"/>
-              <a:t>10/17/24</a:t>
+              <a:t>11/14/24</a:t>
             </a:fld>
             <a:endParaRPr lang="en-US"/>
           </a:p>
@@ -2598,7 +2598,7 @@
           <a:p>
             <a:fld id="{44B5AA74-E516-FF41-BA14-5BA898D18DE1}" type="datetimeFigureOut">
               <a:rPr lang="en-US" smtClean="0"/>
-              <a:t>10/17/24</a:t>
+              <a:t>11/14/24</a:t>
             </a:fld>
             <a:endParaRPr lang="en-US"/>
           </a:p>
@@ -2693,7 +2693,7 @@
           <a:p>
             <a:fld id="{44B5AA74-E516-FF41-BA14-5BA898D18DE1}" type="datetimeFigureOut">
               <a:rPr lang="en-US" smtClean="0"/>
-              <a:t>10/17/24</a:t>
+              <a:t>11/14/24</a:t>
             </a:fld>
             <a:endParaRPr lang="en-US"/>
           </a:p>
@@ -2970,7 +2970,7 @@
           <a:p>
             <a:fld id="{44B5AA74-E516-FF41-BA14-5BA898D18DE1}" type="datetimeFigureOut">
               <a:rPr lang="en-US" smtClean="0"/>
-              <a:t>10/17/24</a:t>
+              <a:t>11/14/24</a:t>
             </a:fld>
             <a:endParaRPr lang="en-US"/>
           </a:p>
@@ -3227,7 +3227,7 @@
           <a:p>
             <a:fld id="{44B5AA74-E516-FF41-BA14-5BA898D18DE1}" type="datetimeFigureOut">
               <a:rPr lang="en-US" smtClean="0"/>
-              <a:t>10/17/24</a:t>
+              <a:t>11/14/24</a:t>
             </a:fld>
             <a:endParaRPr lang="en-US"/>
           </a:p>
@@ -3440,7 +3440,7 @@
           <a:p>
             <a:fld id="{44B5AA74-E516-FF41-BA14-5BA898D18DE1}" type="datetimeFigureOut">
               <a:rPr lang="en-US" smtClean="0"/>
-              <a:t>10/17/24</a:t>
+              <a:t>11/14/24</a:t>
             </a:fld>
             <a:endParaRPr lang="en-US"/>
           </a:p>

</xml_diff>